<commit_message>
Fixed small typos in slides
</commit_message>
<xml_diff>
--- a/slides/10_IntroductionToClustering_Part2.pptx
+++ b/slides/10_IntroductionToClustering_Part2.pptx
@@ -246,7 +246,7 @@
           <a:p>
             <a:fld id="{ED460DB7-3564-4028-881B-4A225B453265}" type="datetimeFigureOut">
               <a:rPr lang="en-US" smtClean="0"/>
-              <a:t>7/18/2023</a:t>
+              <a:t>3/30/2024</a:t>
             </a:fld>
             <a:endParaRPr lang="en-US"/>
           </a:p>
@@ -3720,7 +3720,7 @@
           <a:p>
             <a:fld id="{C62B3463-61C8-4819-BC9A-C94FD847F060}" type="datetimeFigureOut">
               <a:rPr lang="en-US" smtClean="0"/>
-              <a:t>7/18/2023</a:t>
+              <a:t>3/30/2024</a:t>
             </a:fld>
             <a:endParaRPr lang="en-US"/>
           </a:p>
@@ -3918,7 +3918,7 @@
           <a:p>
             <a:fld id="{C62B3463-61C8-4819-BC9A-C94FD847F060}" type="datetimeFigureOut">
               <a:rPr lang="en-US" smtClean="0"/>
-              <a:t>7/18/2023</a:t>
+              <a:t>3/30/2024</a:t>
             </a:fld>
             <a:endParaRPr lang="en-US"/>
           </a:p>
@@ -4126,7 +4126,7 @@
           <a:p>
             <a:fld id="{C62B3463-61C8-4819-BC9A-C94FD847F060}" type="datetimeFigureOut">
               <a:rPr lang="en-US" smtClean="0"/>
-              <a:t>7/18/2023</a:t>
+              <a:t>3/30/2024</a:t>
             </a:fld>
             <a:endParaRPr lang="en-US"/>
           </a:p>
@@ -5546,7 +5546,7 @@
           <a:p>
             <a:fld id="{C62B3463-61C8-4819-BC9A-C94FD847F060}" type="datetimeFigureOut">
               <a:rPr lang="en-US" smtClean="0"/>
-              <a:t>7/18/2023</a:t>
+              <a:t>3/30/2024</a:t>
             </a:fld>
             <a:endParaRPr lang="en-US"/>
           </a:p>
@@ -5987,7 +5987,7 @@
           <a:p>
             <a:fld id="{4ACD6B4E-9726-48B7-95FC-86DC5068328F}" type="datetimeFigureOut">
               <a:rPr lang="en-US" smtClean="0"/>
-              <a:t>7/18/2023</a:t>
+              <a:t>3/30/2024</a:t>
             </a:fld>
             <a:endParaRPr lang="en-US"/>
           </a:p>
@@ -6262,7 +6262,7 @@
           <a:p>
             <a:fld id="{C62B3463-61C8-4819-BC9A-C94FD847F060}" type="datetimeFigureOut">
               <a:rPr lang="en-US" smtClean="0"/>
-              <a:t>7/18/2023</a:t>
+              <a:t>3/30/2024</a:t>
             </a:fld>
             <a:endParaRPr lang="en-US"/>
           </a:p>
@@ -6527,7 +6527,7 @@
           <a:p>
             <a:fld id="{C62B3463-61C8-4819-BC9A-C94FD847F060}" type="datetimeFigureOut">
               <a:rPr lang="en-US" smtClean="0"/>
-              <a:t>7/18/2023</a:t>
+              <a:t>3/30/2024</a:t>
             </a:fld>
             <a:endParaRPr lang="en-US"/>
           </a:p>
@@ -6939,7 +6939,7 @@
           <a:p>
             <a:fld id="{C62B3463-61C8-4819-BC9A-C94FD847F060}" type="datetimeFigureOut">
               <a:rPr lang="en-US" smtClean="0"/>
-              <a:t>7/18/2023</a:t>
+              <a:t>3/30/2024</a:t>
             </a:fld>
             <a:endParaRPr lang="en-US"/>
           </a:p>
@@ -7080,7 +7080,7 @@
           <a:p>
             <a:fld id="{C62B3463-61C8-4819-BC9A-C94FD847F060}" type="datetimeFigureOut">
               <a:rPr lang="en-US" smtClean="0"/>
-              <a:t>7/18/2023</a:t>
+              <a:t>3/30/2024</a:t>
             </a:fld>
             <a:endParaRPr lang="en-US"/>
           </a:p>
@@ -7193,7 +7193,7 @@
           <a:p>
             <a:fld id="{C62B3463-61C8-4819-BC9A-C94FD847F060}" type="datetimeFigureOut">
               <a:rPr lang="en-US" smtClean="0"/>
-              <a:t>7/18/2023</a:t>
+              <a:t>3/30/2024</a:t>
             </a:fld>
             <a:endParaRPr lang="en-US"/>
           </a:p>
@@ -7504,7 +7504,7 @@
           <a:p>
             <a:fld id="{C62B3463-61C8-4819-BC9A-C94FD847F060}" type="datetimeFigureOut">
               <a:rPr lang="en-US" smtClean="0"/>
-              <a:t>7/18/2023</a:t>
+              <a:t>3/30/2024</a:t>
             </a:fld>
             <a:endParaRPr lang="en-US"/>
           </a:p>
@@ -7792,7 +7792,7 @@
           <a:p>
             <a:fld id="{C62B3463-61C8-4819-BC9A-C94FD847F060}" type="datetimeFigureOut">
               <a:rPr lang="en-US" smtClean="0"/>
-              <a:t>7/18/2023</a:t>
+              <a:t>3/30/2024</a:t>
             </a:fld>
             <a:endParaRPr lang="en-US"/>
           </a:p>
@@ -8033,7 +8033,7 @@
           <a:p>
             <a:fld id="{C62B3463-61C8-4819-BC9A-C94FD847F060}" type="datetimeFigureOut">
               <a:rPr lang="en-US" smtClean="0"/>
-              <a:t>7/18/2023</a:t>
+              <a:t>3/30/2024</a:t>
             </a:fld>
             <a:endParaRPr lang="en-US"/>
           </a:p>
@@ -9145,7 +9145,7 @@
           <a:p>
             <a:r>
               <a:rPr lang="en-US" sz="1100" dirty="0"/>
-              <a:t>Copyright 2020,2021, 2022, 2023, Stephen F Elston. All rights reserved.</a:t>
+              <a:t>Copyright 2020,2021, 2022, 2023, 2024, Stephen F Elston. All rights reserved.</a:t>
             </a:r>
           </a:p>
           <a:p>
@@ -19958,7 +19958,7 @@
               <a:rPr lang="en-US" dirty="0">
                 <a:latin typeface="+mn-lt"/>
               </a:rPr>
-              <a:t>OPTICS uses a heuristic to find two distances</a:t>
+              <a:t>OPTICS uses a heuristic to find distances</a:t>
             </a:r>
           </a:p>
           <a:p>
@@ -34815,8 +34815,8 @@
           </a:p>
         </p:txBody>
       </p:sp>
-      <mc:AlternateContent xmlns:mc="http://schemas.openxmlformats.org/markup-compatibility/2006" xmlns:a14="http://schemas.microsoft.com/office/drawing/2010/main">
-        <mc:Choice Requires="a14">
+      <mc:AlternateContent xmlns:mc="http://schemas.openxmlformats.org/markup-compatibility/2006">
+        <mc:Choice xmlns:a14="http://schemas.microsoft.com/office/drawing/2010/main" Requires="a14">
           <p:sp>
             <p:nvSpPr>
               <p:cNvPr id="3" name="Content Placeholder 2"/>
@@ -35113,7 +35113,7 @@
               <a:p>
                 <a:pPr lvl="1"/>
                 <a:r>
-                  <a:rPr lang="en-US" dirty="0">
+                  <a:rPr lang="en-US" sz="2600" dirty="0">
                     <a:latin typeface="+mn-lt"/>
                   </a:rPr>
                   <a:t>The row sum are zero, </a:t>
@@ -35125,7 +35125,7 @@
                         <m:chr m:val="∑"/>
                         <m:supHide m:val="on"/>
                         <m:ctrlPr>
-                          <a:rPr lang="en-US" b="0" i="1" smtClean="0">
+                          <a:rPr lang="en-US" sz="2600" b="0" i="1" smtClean="0">
                             <a:latin typeface="Cambria Math" panose="02040503050406030204" pitchFamily="18" charset="0"/>
                           </a:rPr>
                         </m:ctrlPr>
@@ -35135,13 +35135,13 @@
                           <m:rPr>
                             <m:brk m:alnAt="7"/>
                           </m:rPr>
-                          <a:rPr lang="en-US" b="0" i="1" smtClean="0">
+                          <a:rPr lang="en-US" sz="2600" b="0" i="1" smtClean="0">
                             <a:latin typeface="Cambria Math" panose="02040503050406030204" pitchFamily="18" charset="0"/>
                           </a:rPr>
                           <m:t>𝑟</m:t>
                         </m:r>
                         <m:r>
-                          <a:rPr lang="en-US" b="0" i="1" smtClean="0">
+                          <a:rPr lang="en-US" sz="2600" b="0" i="1" smtClean="0">
                             <a:latin typeface="Cambria Math" panose="02040503050406030204" pitchFamily="18" charset="0"/>
                           </a:rPr>
                           <m:t>𝑜𝑤</m:t>
@@ -35150,7 +35150,7 @@
                       <m:sup/>
                       <m:e>
                         <m:r>
-                          <a:rPr lang="en-US" b="0" i="1" smtClean="0">
+                          <a:rPr lang="en-US" sz="2600" b="0" i="1" smtClean="0">
                             <a:latin typeface="Cambria Math" panose="02040503050406030204" pitchFamily="18" charset="0"/>
                           </a:rPr>
                           <m:t>𝐿</m:t>
@@ -35158,7 +35158,7 @@
                       </m:e>
                     </m:nary>
                     <m:r>
-                      <a:rPr lang="en-US" b="0" i="1" smtClean="0">
+                      <a:rPr lang="en-US" sz="2600" b="0" i="1" smtClean="0">
                         <a:latin typeface="Cambria Math" panose="02040503050406030204" pitchFamily="18" charset="0"/>
                       </a:rPr>
                       <m:t>=0</m:t>
@@ -35166,7 +35166,7 @@
                   </m:oMath>
                 </a14:m>
                 <a:r>
-                  <a:rPr lang="en-US" dirty="0">
+                  <a:rPr lang="en-US" sz="2600" dirty="0">
                     <a:latin typeface="+mn-lt"/>
                   </a:rPr>
                   <a:t> </a:t>
@@ -35175,19 +35175,19 @@
               <a:p>
                 <a:pPr lvl="1"/>
                 <a:r>
-                  <a:rPr lang="en-US" dirty="0">
+                  <a:rPr lang="en-US" sz="2600" dirty="0">
                     <a:latin typeface="+mn-lt"/>
                   </a:rPr>
                   <a:t>For a </a:t>
                 </a:r>
                 <a:r>
-                  <a:rPr lang="en-US" b="1" dirty="0">
+                  <a:rPr lang="en-US" sz="2600" b="1" dirty="0">
                     <a:latin typeface="+mn-lt"/>
                   </a:rPr>
                   <a:t>single graph component </a:t>
                 </a:r>
                 <a:r>
-                  <a:rPr lang="en-US" dirty="0">
+                  <a:rPr lang="en-US" sz="2600" dirty="0">
                     <a:latin typeface="+mn-lt"/>
                   </a:rPr>
                   <a:t>the smallest eigenvalue, </a:t>
@@ -35195,14 +35195,14 @@
                 <a14:m>
                   <m:oMath xmlns:m="http://schemas.openxmlformats.org/officeDocument/2006/math">
                     <m:r>
-                      <a:rPr lang="en-US" i="1" smtClean="0">
+                      <a:rPr lang="en-US" sz="2600" i="1" smtClean="0">
                         <a:latin typeface="Cambria Math" panose="02040503050406030204" pitchFamily="18" charset="0"/>
                         <a:ea typeface="Cambria Math" panose="02040503050406030204" pitchFamily="18" charset="0"/>
                       </a:rPr>
                       <m:t>𝜆</m:t>
                     </m:r>
                     <m:r>
-                      <a:rPr lang="en-US" b="0" i="1" smtClean="0">
+                      <a:rPr lang="en-US" sz="2600" b="0" i="1" smtClean="0">
                         <a:latin typeface="Cambria Math" panose="02040503050406030204" pitchFamily="18" charset="0"/>
                         <a:ea typeface="Cambria Math" panose="02040503050406030204" pitchFamily="18" charset="0"/>
                       </a:rPr>
@@ -35211,7 +35211,7 @@
                   </m:oMath>
                 </a14:m>
                 <a:r>
-                  <a:rPr lang="en-US" dirty="0">
+                  <a:rPr lang="en-US" sz="2600" dirty="0">
                     <a:latin typeface="+mn-lt"/>
                   </a:rPr>
                   <a:t> </a:t>
@@ -35220,7 +35220,7 @@
               <a:p>
                 <a:pPr lvl="1"/>
                 <a:r>
-                  <a:rPr lang="en-US" dirty="0">
+                  <a:rPr lang="en-US" sz="2600" dirty="0">
                     <a:latin typeface="+mn-lt"/>
                   </a:rPr>
                   <a:t>For </a:t>
@@ -35228,14 +35228,14 @@
                 <a14:m>
                   <m:oMath xmlns:m="http://schemas.openxmlformats.org/officeDocument/2006/math">
                     <m:r>
-                      <a:rPr lang="en-US" i="1">
+                      <a:rPr lang="en-US" sz="2600" i="1">
                         <a:latin typeface="Cambria Math" panose="02040503050406030204" pitchFamily="18" charset="0"/>
                         <a:ea typeface="Cambria Math" panose="02040503050406030204" pitchFamily="18" charset="0"/>
                       </a:rPr>
                       <m:t>𝜆</m:t>
                     </m:r>
                     <m:r>
-                      <a:rPr lang="en-US" i="1">
+                      <a:rPr lang="en-US" sz="2600" i="1">
                         <a:latin typeface="Cambria Math" panose="02040503050406030204" pitchFamily="18" charset="0"/>
                         <a:ea typeface="Cambria Math" panose="02040503050406030204" pitchFamily="18" charset="0"/>
                       </a:rPr>
@@ -35244,7 +35244,7 @@
                   </m:oMath>
                 </a14:m>
                 <a:r>
-                  <a:rPr lang="en-US" dirty="0">
+                  <a:rPr lang="en-US" sz="2600" dirty="0">
                     <a:latin typeface="+mn-lt"/>
                   </a:rPr>
                   <a:t>, the corresponding eigenvector is all 1’, </a:t>
@@ -35252,13 +35252,13 @@
                 <a14:m>
                   <m:oMath xmlns:m="http://schemas.openxmlformats.org/officeDocument/2006/math">
                     <m:r>
-                      <a:rPr lang="en-US" b="0" i="1" smtClean="0">
+                      <a:rPr lang="en-US" sz="2600" b="0" i="1" smtClean="0">
                         <a:latin typeface="Cambria Math" panose="02040503050406030204" pitchFamily="18" charset="0"/>
                       </a:rPr>
                       <m:t>𝑣</m:t>
                     </m:r>
                     <m:r>
-                      <a:rPr lang="en-US" b="0" i="1" smtClean="0">
+                      <a:rPr lang="en-US" sz="2600" b="0" i="1" smtClean="0">
                         <a:latin typeface="Cambria Math" panose="02040503050406030204" pitchFamily="18" charset="0"/>
                       </a:rPr>
                       <m:t>=</m:t>
@@ -35268,14 +35268,14 @@
                         <m:begChr m:val="["/>
                         <m:endChr m:val="]"/>
                         <m:ctrlPr>
-                          <a:rPr lang="en-US" b="0" i="1" smtClean="0">
+                          <a:rPr lang="en-US" sz="2600" b="0" i="1" smtClean="0">
                             <a:latin typeface="Cambria Math" panose="02040503050406030204" pitchFamily="18" charset="0"/>
                           </a:rPr>
                         </m:ctrlPr>
                       </m:dPr>
                       <m:e>
                         <m:r>
-                          <a:rPr lang="en-US" b="0" i="1" smtClean="0">
+                          <a:rPr lang="en-US" sz="2600" b="0" i="1" smtClean="0">
                             <a:latin typeface="Cambria Math" panose="02040503050406030204" pitchFamily="18" charset="0"/>
                           </a:rPr>
                           <m:t>1, 1, 1, …, 1</m:t>
@@ -35284,7 +35284,7 @@
                     </m:d>
                   </m:oMath>
                 </a14:m>
-                <a:endParaRPr lang="en-US" dirty="0">
+                <a:endParaRPr lang="en-US" sz="2600" dirty="0">
                   <a:latin typeface="+mn-lt"/>
                 </a:endParaRPr>
               </a:p>
@@ -35292,7 +35292,7 @@
                 <a:pPr marL="0" indent="0">
                   <a:buNone/>
                 </a:pPr>
-                <a:endParaRPr lang="en-US" sz="1700">
+                <a:endParaRPr lang="en-US" sz="2600" dirty="0">
                   <a:latin typeface="+mn-lt"/>
                 </a:endParaRPr>
               </a:p>
@@ -35301,16 +35301,10 @@
                   <a:buNone/>
                 </a:pPr>
                 <a:r>
-                  <a:rPr lang="en-US" sz="1700">
-                    <a:latin typeface="+mn-lt"/>
-                  </a:rPr>
-                  <a:t>For </a:t>
-                </a:r>
-                <a:r>
                   <a:rPr lang="en-US" sz="1700" dirty="0">
                     <a:latin typeface="+mn-lt"/>
                   </a:rPr>
-                  <a:t>a comprehensive treatment of graph partitioning and the graph Laplacian, see</a:t>
+                  <a:t>For a comprehensive treatment of graph partitioning and the graph Laplacian, see</a:t>
                 </a:r>
                 <a:r>
                   <a:rPr lang="en-US" sz="1700" dirty="0">
@@ -35326,7 +35320,7 @@
             </p:txBody>
           </p:sp>
         </mc:Choice>
-        <mc:Fallback xmlns="">
+        <mc:Fallback>
           <p:sp>
             <p:nvSpPr>
               <p:cNvPr id="3" name="Content Placeholder 2"/>

</xml_diff>

<commit_message>
Tyop corrections from lecture
</commit_message>
<xml_diff>
--- a/slides/10_IntroductionToClustering_Part2.pptx
+++ b/slides/10_IntroductionToClustering_Part2.pptx
@@ -10445,8 +10445,8 @@
           </a:p>
         </p:txBody>
       </p:sp>
-      <mc:AlternateContent xmlns:mc="http://schemas.openxmlformats.org/markup-compatibility/2006" xmlns:a14="http://schemas.microsoft.com/office/drawing/2010/main">
-        <mc:Choice Requires="a14">
+      <mc:AlternateContent xmlns:mc="http://schemas.openxmlformats.org/markup-compatibility/2006">
+        <mc:Choice xmlns:a14="http://schemas.microsoft.com/office/drawing/2010/main" Requires="a14">
           <p:sp>
             <p:nvSpPr>
               <p:cNvPr id="6" name="TextBox 5">
@@ -10462,7 +10462,7 @@
             <p:spPr>
               <a:xfrm>
                 <a:off x="396498" y="1709893"/>
-                <a:ext cx="5584552" cy="3539430"/>
+                <a:ext cx="5584552" cy="3970318"/>
               </a:xfrm>
               <a:prstGeom prst="rect">
                 <a:avLst/>
@@ -10695,13 +10695,13 @@
                 </a:pPr>
                 <a:r>
                   <a:rPr lang="en-US" sz="2800" dirty="0"/>
-                  <a:t>No disconnected graphs!</a:t>
+                  <a:t>Can get disconnected graph components </a:t>
                 </a:r>
               </a:p>
             </p:txBody>
           </p:sp>
         </mc:Choice>
-        <mc:Fallback xmlns="">
+        <mc:Fallback>
           <p:sp>
             <p:nvSpPr>
               <p:cNvPr id="6" name="TextBox 5">
@@ -10719,7 +10719,7 @@
             <p:spPr>
               <a:xfrm>
                 <a:off x="396498" y="1709893"/>
-                <a:ext cx="5584552" cy="3539430"/>
+                <a:ext cx="5584552" cy="3970318"/>
               </a:xfrm>
               <a:prstGeom prst="rect">
                 <a:avLst/>
@@ -10727,7 +10727,7 @@
               <a:blipFill>
                 <a:blip r:embed="rId3"/>
                 <a:stretch>
-                  <a:fillRect l="-1965" t="-1549" b="-3959"/>
+                  <a:fillRect l="-1965" t="-1380" b="-3374"/>
                 </a:stretch>
               </a:blipFill>
             </p:spPr>
@@ -12012,16 +12012,10 @@
           </a:p>
           <a:p>
             <a:r>
-              <a:rPr lang="en-US" sz="2400" dirty="0">
-                <a:latin typeface="+mn-lt"/>
-              </a:rPr>
-              <a:t>Exemplar p</a:t>
-            </a:r>
-            <a:r>
               <a:rPr lang="en-US" dirty="0">
                 <a:latin typeface="+mn-lt"/>
               </a:rPr>
-              <a:t>oints are central nodes on a </a:t>
+              <a:t>Exemplar points are central nodes on a </a:t>
             </a:r>
             <a:r>
               <a:rPr lang="en-US" b="1" dirty="0">
@@ -20280,7 +20274,20 @@
               <a:rPr lang="en-US" dirty="0">
                 <a:latin typeface="+mn-lt"/>
               </a:rPr>
-              <a:t>Single  </a:t>
+              <a:t>Clusters formed by partitioning graph constrained by </a:t>
+            </a:r>
+            <a:r>
+              <a:rPr lang="en-US" dirty="0" err="1">
+                <a:latin typeface="Courier New" panose="02070309020205020404" pitchFamily="49" charset="0"/>
+                <a:cs typeface="Courier New" panose="02070309020205020404" pitchFamily="49" charset="0"/>
+              </a:rPr>
+              <a:t>min_pts</a:t>
+            </a:r>
+            <a:r>
+              <a:rPr lang="en-US" dirty="0">
+                <a:latin typeface="+mn-lt"/>
+              </a:rPr>
+              <a:t>  </a:t>
             </a:r>
           </a:p>
         </p:txBody>
@@ -38853,7 +38860,13 @@
                       <a:rPr lang="en-US" b="0" i="1" smtClean="0">
                         <a:latin typeface="Cambria Math" panose="02040503050406030204" pitchFamily="18" charset="0"/>
                       </a:rPr>
-                      <m:t>=1</m:t>
+                      <m:t>=</m:t>
+                    </m:r>
+                    <m:r>
+                      <a:rPr lang="en-US" b="0" i="1" smtClean="0">
+                        <a:latin typeface="Cambria Math" panose="02040503050406030204" pitchFamily="18" charset="0"/>
+                      </a:rPr>
+                      <m:t>1</m:t>
                     </m:r>
                   </m:oMath>
                 </a14:m>
@@ -39082,7 +39095,7 @@
               <a:rPr lang="en-US" sz="2800" dirty="0">
                 <a:latin typeface="+mn-lt"/>
               </a:rPr>
-              <a:t>PCA is a linear projection</a:t>
+              <a:t>PCA is a linear Euclidian projection</a:t>
             </a:r>
           </a:p>
           <a:p>
@@ -39118,6 +39131,15 @@
                 <a:latin typeface="+mn-lt"/>
               </a:rPr>
               <a:t>Manifold learning  </a:t>
+            </a:r>
+          </a:p>
+          <a:p>
+            <a:pPr lvl="1"/>
+            <a:r>
+              <a:rPr lang="en-US" dirty="0">
+                <a:latin typeface="+mn-lt"/>
+              </a:rPr>
+              <a:t>Our next lesson! </a:t>
             </a:r>
           </a:p>
           <a:p>
@@ -39464,6 +39486,37 @@
                                           <p:spTgt spid="3">
                                             <p:txEl>
                                               <p:pRg st="8" end="8"/>
+                                            </p:txEl>
+                                          </p:spTgt>
+                                        </p:tgtEl>
+                                        <p:attrNameLst>
+                                          <p:attrName>style.visibility</p:attrName>
+                                        </p:attrNameLst>
+                                      </p:cBhvr>
+                                      <p:to>
+                                        <p:strVal val="visible"/>
+                                      </p:to>
+                                    </p:set>
+                                  </p:childTnLst>
+                                </p:cTn>
+                              </p:par>
+                              <p:par>
+                                <p:cTn id="29" presetID="1" presetClass="entr" presetSubtype="0" fill="hold" nodeType="withEffect">
+                                  <p:stCondLst>
+                                    <p:cond delay="0"/>
+                                  </p:stCondLst>
+                                  <p:childTnLst>
+                                    <p:set>
+                                      <p:cBhvr>
+                                        <p:cTn id="30" dur="1" fill="hold">
+                                          <p:stCondLst>
+                                            <p:cond delay="0"/>
+                                          </p:stCondLst>
+                                        </p:cTn>
+                                        <p:tgtEl>
+                                          <p:spTgt spid="3">
+                                            <p:txEl>
+                                              <p:pRg st="9" end="9"/>
                                             </p:txEl>
                                           </p:spTgt>
                                         </p:tgtEl>

</xml_diff>